<commit_message>
Added routes to screen.ppt
</commit_message>
<xml_diff>
--- a/client/public/screens.pptx
+++ b/client/public/screens.pptx
@@ -5,12 +5,11 @@
     <p:sldMasterId id="2147483648" r:id="rId1"/>
   </p:sldMasterIdLst>
   <p:notesMasterIdLst>
-    <p:notesMasterId r:id="rId5"/>
+    <p:notesMasterId r:id="rId4"/>
   </p:notesMasterIdLst>
   <p:sldIdLst>
     <p:sldId id="256" r:id="rId2"/>
     <p:sldId id="257" r:id="rId3"/>
-    <p:sldId id="258" r:id="rId4"/>
   </p:sldIdLst>
   <p:sldSz cx="12192000" cy="6858000"/>
   <p:notesSz cx="6858000" cy="9144000"/>
@@ -109,6 +108,11 @@
       </a:defRPr>
     </a:lvl9pPr>
   </p:defaultTextStyle>
+  <p:extLst>
+    <p:ext uri="{EFAFB233-063F-42B5-8137-9DF3F51BA10A}">
+      <p15:sldGuideLst xmlns:p15="http://schemas.microsoft.com/office/powerpoint/2012/main"/>
+    </p:ext>
+  </p:extLst>
 </p:presentation>
 </file>
 
@@ -194,7 +198,7 @@
           <a:p>
             <a:fld id="{D636DE42-ACE5-2D44-B251-4BE09402BE40}" type="datetimeFigureOut">
               <a:rPr lang="en-US" smtClean="0"/>
-              <a:t>9/30/18</a:t>
+              <a:t>10/3/18</a:t>
             </a:fld>
             <a:endParaRPr lang="en-US"/>
           </a:p>
@@ -692,7 +696,7 @@
           <a:p>
             <a:fld id="{B979A51F-13BC-5945-BBC4-6F6E95A08EA1}" type="datetimeFigureOut">
               <a:rPr lang="en-US" smtClean="0"/>
-              <a:t>9/30/18</a:t>
+              <a:t>10/3/18</a:t>
             </a:fld>
             <a:endParaRPr lang="en-US"/>
           </a:p>
@@ -890,7 +894,7 @@
           <a:p>
             <a:fld id="{B979A51F-13BC-5945-BBC4-6F6E95A08EA1}" type="datetimeFigureOut">
               <a:rPr lang="en-US" smtClean="0"/>
-              <a:t>9/30/18</a:t>
+              <a:t>10/3/18</a:t>
             </a:fld>
             <a:endParaRPr lang="en-US"/>
           </a:p>
@@ -1098,7 +1102,7 @@
           <a:p>
             <a:fld id="{B979A51F-13BC-5945-BBC4-6F6E95A08EA1}" type="datetimeFigureOut">
               <a:rPr lang="en-US" smtClean="0"/>
-              <a:t>9/30/18</a:t>
+              <a:t>10/3/18</a:t>
             </a:fld>
             <a:endParaRPr lang="en-US"/>
           </a:p>
@@ -1296,7 +1300,7 @@
           <a:p>
             <a:fld id="{B979A51F-13BC-5945-BBC4-6F6E95A08EA1}" type="datetimeFigureOut">
               <a:rPr lang="en-US" smtClean="0"/>
-              <a:t>9/30/18</a:t>
+              <a:t>10/3/18</a:t>
             </a:fld>
             <a:endParaRPr lang="en-US"/>
           </a:p>
@@ -1571,7 +1575,7 @@
           <a:p>
             <a:fld id="{B979A51F-13BC-5945-BBC4-6F6E95A08EA1}" type="datetimeFigureOut">
               <a:rPr lang="en-US" smtClean="0"/>
-              <a:t>9/30/18</a:t>
+              <a:t>10/3/18</a:t>
             </a:fld>
             <a:endParaRPr lang="en-US"/>
           </a:p>
@@ -1836,7 +1840,7 @@
           <a:p>
             <a:fld id="{B979A51F-13BC-5945-BBC4-6F6E95A08EA1}" type="datetimeFigureOut">
               <a:rPr lang="en-US" smtClean="0"/>
-              <a:t>9/30/18</a:t>
+              <a:t>10/3/18</a:t>
             </a:fld>
             <a:endParaRPr lang="en-US"/>
           </a:p>
@@ -2248,7 +2252,7 @@
           <a:p>
             <a:fld id="{B979A51F-13BC-5945-BBC4-6F6E95A08EA1}" type="datetimeFigureOut">
               <a:rPr lang="en-US" smtClean="0"/>
-              <a:t>9/30/18</a:t>
+              <a:t>10/3/18</a:t>
             </a:fld>
             <a:endParaRPr lang="en-US"/>
           </a:p>
@@ -2389,7 +2393,7 @@
           <a:p>
             <a:fld id="{B979A51F-13BC-5945-BBC4-6F6E95A08EA1}" type="datetimeFigureOut">
               <a:rPr lang="en-US" smtClean="0"/>
-              <a:t>9/30/18</a:t>
+              <a:t>10/3/18</a:t>
             </a:fld>
             <a:endParaRPr lang="en-US"/>
           </a:p>
@@ -2502,7 +2506,7 @@
           <a:p>
             <a:fld id="{B979A51F-13BC-5945-BBC4-6F6E95A08EA1}" type="datetimeFigureOut">
               <a:rPr lang="en-US" smtClean="0"/>
-              <a:t>9/30/18</a:t>
+              <a:t>10/3/18</a:t>
             </a:fld>
             <a:endParaRPr lang="en-US"/>
           </a:p>
@@ -2813,7 +2817,7 @@
           <a:p>
             <a:fld id="{B979A51F-13BC-5945-BBC4-6F6E95A08EA1}" type="datetimeFigureOut">
               <a:rPr lang="en-US" smtClean="0"/>
-              <a:t>9/30/18</a:t>
+              <a:t>10/3/18</a:t>
             </a:fld>
             <a:endParaRPr lang="en-US"/>
           </a:p>
@@ -3101,7 +3105,7 @@
           <a:p>
             <a:fld id="{B979A51F-13BC-5945-BBC4-6F6E95A08EA1}" type="datetimeFigureOut">
               <a:rPr lang="en-US" smtClean="0"/>
-              <a:t>9/30/18</a:t>
+              <a:t>10/3/18</a:t>
             </a:fld>
             <a:endParaRPr lang="en-US"/>
           </a:p>
@@ -3342,7 +3346,7 @@
           <a:p>
             <a:fld id="{B979A51F-13BC-5945-BBC4-6F6E95A08EA1}" type="datetimeFigureOut">
               <a:rPr lang="en-US" smtClean="0"/>
-              <a:t>9/30/18</a:t>
+              <a:t>10/3/18</a:t>
             </a:fld>
             <a:endParaRPr lang="en-US"/>
           </a:p>
@@ -4909,6 +4913,111 @@
           </a:fontRef>
         </p:style>
       </p:cxnSp>
+      <p:sp>
+        <p:nvSpPr>
+          <p:cNvPr id="2" name="TextBox 1">
+            <a:extLst>
+              <a:ext uri="{FF2B5EF4-FFF2-40B4-BE49-F238E27FC236}">
+                <a16:creationId xmlns:a16="http://schemas.microsoft.com/office/drawing/2014/main" id="{3AC933B7-5661-1546-9C06-A3FA4BBB9CA3}"/>
+              </a:ext>
+            </a:extLst>
+          </p:cNvPr>
+          <p:cNvSpPr txBox="1"/>
+          <p:nvPr/>
+        </p:nvSpPr>
+        <p:spPr>
+          <a:xfrm>
+            <a:off x="2316480" y="137160"/>
+            <a:ext cx="817853" cy="369332"/>
+          </a:xfrm>
+          <a:prstGeom prst="rect">
+            <a:avLst/>
+          </a:prstGeom>
+          <a:noFill/>
+        </p:spPr>
+        <p:txBody>
+          <a:bodyPr wrap="none" rtlCol="0">
+            <a:spAutoFit/>
+          </a:bodyPr>
+          <a:lstStyle/>
+          <a:p>
+            <a:r>
+              <a:rPr lang="en-US" dirty="0"/>
+              <a:t>/home</a:t>
+            </a:r>
+          </a:p>
+        </p:txBody>
+      </p:sp>
+      <p:sp>
+        <p:nvSpPr>
+          <p:cNvPr id="3" name="TextBox 2">
+            <a:extLst>
+              <a:ext uri="{FF2B5EF4-FFF2-40B4-BE49-F238E27FC236}">
+                <a16:creationId xmlns:a16="http://schemas.microsoft.com/office/drawing/2014/main" id="{842A5A55-F633-1943-BD8C-A242275B5021}"/>
+              </a:ext>
+            </a:extLst>
+          </p:cNvPr>
+          <p:cNvSpPr txBox="1"/>
+          <p:nvPr/>
+        </p:nvSpPr>
+        <p:spPr>
+          <a:xfrm>
+            <a:off x="8081485" y="0"/>
+            <a:ext cx="1166025" cy="369332"/>
+          </a:xfrm>
+          <a:prstGeom prst="rect">
+            <a:avLst/>
+          </a:prstGeom>
+          <a:noFill/>
+        </p:spPr>
+        <p:txBody>
+          <a:bodyPr wrap="none" rtlCol="0">
+            <a:spAutoFit/>
+          </a:bodyPr>
+          <a:lstStyle/>
+          <a:p>
+            <a:r>
+              <a:rPr lang="en-US" dirty="0"/>
+              <a:t>/challenge</a:t>
+            </a:r>
+          </a:p>
+        </p:txBody>
+      </p:sp>
+      <p:sp>
+        <p:nvSpPr>
+          <p:cNvPr id="33" name="TextBox 32">
+            <a:extLst>
+              <a:ext uri="{FF2B5EF4-FFF2-40B4-BE49-F238E27FC236}">
+                <a16:creationId xmlns:a16="http://schemas.microsoft.com/office/drawing/2014/main" id="{356FA721-2253-FD40-BC0E-D7EFDA9B97DB}"/>
+              </a:ext>
+            </a:extLst>
+          </p:cNvPr>
+          <p:cNvSpPr txBox="1"/>
+          <p:nvPr/>
+        </p:nvSpPr>
+        <p:spPr>
+          <a:xfrm>
+            <a:off x="6345496" y="4540044"/>
+            <a:ext cx="888320" cy="369332"/>
+          </a:xfrm>
+          <a:prstGeom prst="rect">
+            <a:avLst/>
+          </a:prstGeom>
+          <a:noFill/>
+        </p:spPr>
+        <p:txBody>
+          <a:bodyPr wrap="none" rtlCol="0">
+            <a:spAutoFit/>
+          </a:bodyPr>
+          <a:lstStyle/>
+          <a:p>
+            <a:r>
+              <a:rPr lang="en-US" dirty="0"/>
+              <a:t>/events</a:t>
+            </a:r>
+          </a:p>
+        </p:txBody>
+      </p:sp>
     </p:spTree>
     <p:extLst>
       <p:ext uri="{BB962C8B-B14F-4D97-AF65-F5344CB8AC3E}">
@@ -5436,42 +5545,47 @@
           </a:p>
         </p:txBody>
       </p:sp>
-    </p:spTree>
-    <p:extLst>
-      <p:ext uri="{BB962C8B-B14F-4D97-AF65-F5344CB8AC3E}">
-        <p14:creationId xmlns:p14="http://schemas.microsoft.com/office/powerpoint/2010/main" val="3348089988"/>
-      </p:ext>
-    </p:extLst>
-  </p:cSld>
-  <p:clrMapOvr>
-    <a:masterClrMapping/>
-  </p:clrMapOvr>
-</p:sld>
-</file>
-
-<file path=ppt/slides/slide3.xml><?xml version="1.0" encoding="utf-8"?>
-<p:sld xmlns:a="http://schemas.openxmlformats.org/drawingml/2006/main" xmlns:r="http://schemas.openxmlformats.org/officeDocument/2006/relationships" xmlns:p="http://schemas.openxmlformats.org/presentationml/2006/main">
-  <p:cSld>
-    <p:spTree>
-      <p:nvGrpSpPr>
-        <p:cNvPr id="1" name=""/>
-        <p:cNvGrpSpPr/>
-        <p:nvPr/>
-      </p:nvGrpSpPr>
-      <p:grpSpPr>
-        <a:xfrm>
-          <a:off x="0" y="0"/>
-          <a:ext cx="0" cy="0"/>
-          <a:chOff x="0" y="0"/>
-          <a:chExt cx="0" cy="0"/>
-        </a:xfrm>
-      </p:grpSpPr>
-      <p:sp>
-        <p:nvSpPr>
-          <p:cNvPr id="2" name="Rectangle 1">
-            <a:extLst>
-              <a:ext uri="{FF2B5EF4-FFF2-40B4-BE49-F238E27FC236}">
-                <a16:creationId xmlns:a16="http://schemas.microsoft.com/office/drawing/2014/main" id="{22A24519-F9AD-6545-99F9-A8227B48AC43}"/>
+      <p:sp>
+        <p:nvSpPr>
+          <p:cNvPr id="11" name="TextBox 10">
+            <a:extLst>
+              <a:ext uri="{FF2B5EF4-FFF2-40B4-BE49-F238E27FC236}">
+                <a16:creationId xmlns:a16="http://schemas.microsoft.com/office/drawing/2014/main" id="{7590643B-BE1E-564C-B7F0-DDBBF0016F69}"/>
+              </a:ext>
+            </a:extLst>
+          </p:cNvPr>
+          <p:cNvSpPr txBox="1"/>
+          <p:nvPr/>
+        </p:nvSpPr>
+        <p:spPr>
+          <a:xfrm>
+            <a:off x="1233539" y="73429"/>
+            <a:ext cx="986104" cy="369332"/>
+          </a:xfrm>
+          <a:prstGeom prst="rect">
+            <a:avLst/>
+          </a:prstGeom>
+          <a:noFill/>
+        </p:spPr>
+        <p:txBody>
+          <a:bodyPr wrap="none" rtlCol="0">
+            <a:spAutoFit/>
+          </a:bodyPr>
+          <a:lstStyle/>
+          <a:p>
+            <a:r>
+              <a:rPr lang="en-US" dirty="0"/>
+              <a:t>/register</a:t>
+            </a:r>
+          </a:p>
+        </p:txBody>
+      </p:sp>
+      <p:sp>
+        <p:nvSpPr>
+          <p:cNvPr id="12" name="Rectangle 11">
+            <a:extLst>
+              <a:ext uri="{FF2B5EF4-FFF2-40B4-BE49-F238E27FC236}">
+                <a16:creationId xmlns:a16="http://schemas.microsoft.com/office/drawing/2014/main" id="{A0F7008B-9556-4049-BE3D-CED261D0BFFB}"/>
               </a:ext>
             </a:extLst>
           </p:cNvPr>
@@ -5480,7 +5594,7 @@
         </p:nvSpPr>
         <p:spPr>
           <a:xfrm>
-            <a:off x="771840" y="619433"/>
+            <a:off x="6662573" y="587786"/>
             <a:ext cx="3952567" cy="5501148"/>
           </a:xfrm>
           <a:prstGeom prst="rect">
@@ -5515,10 +5629,10 @@
       </p:sp>
       <p:sp>
         <p:nvSpPr>
-          <p:cNvPr id="3" name="TextBox 2">
-            <a:extLst>
-              <a:ext uri="{FF2B5EF4-FFF2-40B4-BE49-F238E27FC236}">
-                <a16:creationId xmlns:a16="http://schemas.microsoft.com/office/drawing/2014/main" id="{86F7C1A8-B540-5F45-BAB3-B75E100BC3A6}"/>
+          <p:cNvPr id="13" name="TextBox 12">
+            <a:extLst>
+              <a:ext uri="{FF2B5EF4-FFF2-40B4-BE49-F238E27FC236}">
+                <a16:creationId xmlns:a16="http://schemas.microsoft.com/office/drawing/2014/main" id="{56F5CF0E-E84E-AC43-846C-B507F9D87B7B}"/>
               </a:ext>
             </a:extLst>
           </p:cNvPr>
@@ -5527,7 +5641,7 @@
         </p:nvSpPr>
         <p:spPr>
           <a:xfrm>
-            <a:off x="1779717" y="752168"/>
+            <a:off x="7670450" y="720521"/>
             <a:ext cx="1936812" cy="369332"/>
           </a:xfrm>
           <a:prstGeom prst="rect">
@@ -5550,10 +5664,10 @@
       </p:sp>
       <p:sp>
         <p:nvSpPr>
-          <p:cNvPr id="4" name="Rounded Rectangle 3">
-            <a:extLst>
-              <a:ext uri="{FF2B5EF4-FFF2-40B4-BE49-F238E27FC236}">
-                <a16:creationId xmlns:a16="http://schemas.microsoft.com/office/drawing/2014/main" id="{A9A8986B-0CF4-C04F-8B73-1A40226D3198}"/>
+          <p:cNvPr id="14" name="Rounded Rectangle 13">
+            <a:extLst>
+              <a:ext uri="{FF2B5EF4-FFF2-40B4-BE49-F238E27FC236}">
+                <a16:creationId xmlns:a16="http://schemas.microsoft.com/office/drawing/2014/main" id="{C14A3001-AE58-5542-B90C-E89E5767EBCB}"/>
               </a:ext>
             </a:extLst>
           </p:cNvPr>
@@ -5562,7 +5676,7 @@
         </p:nvSpPr>
         <p:spPr>
           <a:xfrm>
-            <a:off x="1753509" y="1571319"/>
+            <a:off x="8179831" y="1124411"/>
             <a:ext cx="2376046" cy="316479"/>
           </a:xfrm>
           <a:prstGeom prst="roundRect">
@@ -5611,10 +5725,10 @@
       </p:sp>
       <p:sp>
         <p:nvSpPr>
-          <p:cNvPr id="5" name="Rounded Rectangle 4">
-            <a:extLst>
-              <a:ext uri="{FF2B5EF4-FFF2-40B4-BE49-F238E27FC236}">
-                <a16:creationId xmlns:a16="http://schemas.microsoft.com/office/drawing/2014/main" id="{7D226196-0941-054F-90E4-3EF64B8ECF63}"/>
+          <p:cNvPr id="15" name="Rounded Rectangle 14">
+            <a:extLst>
+              <a:ext uri="{FF2B5EF4-FFF2-40B4-BE49-F238E27FC236}">
+                <a16:creationId xmlns:a16="http://schemas.microsoft.com/office/drawing/2014/main" id="{F32F8630-C3C4-274B-A608-F6258ADCFE77}"/>
               </a:ext>
             </a:extLst>
           </p:cNvPr>
@@ -5623,7 +5737,7 @@
         </p:nvSpPr>
         <p:spPr>
           <a:xfrm>
-            <a:off x="1779716" y="1983363"/>
+            <a:off x="8179831" y="1485903"/>
             <a:ext cx="2349839" cy="302342"/>
           </a:xfrm>
           <a:prstGeom prst="roundRect">
@@ -5672,10 +5786,10 @@
       </p:sp>
       <p:sp>
         <p:nvSpPr>
-          <p:cNvPr id="6" name="Rounded Rectangle 5">
-            <a:extLst>
-              <a:ext uri="{FF2B5EF4-FFF2-40B4-BE49-F238E27FC236}">
-                <a16:creationId xmlns:a16="http://schemas.microsoft.com/office/drawing/2014/main" id="{EF9B4962-190D-7842-8CCD-254A238EC399}"/>
+          <p:cNvPr id="16" name="Rounded Rectangle 15">
+            <a:extLst>
+              <a:ext uri="{FF2B5EF4-FFF2-40B4-BE49-F238E27FC236}">
+                <a16:creationId xmlns:a16="http://schemas.microsoft.com/office/drawing/2014/main" id="{CAC267BA-77FE-364C-88A7-1F5A757F9258}"/>
               </a:ext>
             </a:extLst>
           </p:cNvPr>
@@ -5684,7 +5798,7 @@
         </p:nvSpPr>
         <p:spPr>
           <a:xfrm>
-            <a:off x="1779716" y="2381270"/>
+            <a:off x="8141938" y="1846412"/>
             <a:ext cx="2349839" cy="332433"/>
           </a:xfrm>
           <a:prstGeom prst="roundRect">
@@ -5733,10 +5847,10 @@
       </p:sp>
       <p:sp>
         <p:nvSpPr>
-          <p:cNvPr id="7" name="TextBox 6">
-            <a:extLst>
-              <a:ext uri="{FF2B5EF4-FFF2-40B4-BE49-F238E27FC236}">
-                <a16:creationId xmlns:a16="http://schemas.microsoft.com/office/drawing/2014/main" id="{003949A4-A76A-D14C-AC96-B760CD0B18B2}"/>
+          <p:cNvPr id="17" name="TextBox 16">
+            <a:extLst>
+              <a:ext uri="{FF2B5EF4-FFF2-40B4-BE49-F238E27FC236}">
+                <a16:creationId xmlns:a16="http://schemas.microsoft.com/office/drawing/2014/main" id="{74274C6A-1457-7E4C-9113-0FE5AEE78197}"/>
               </a:ext>
             </a:extLst>
           </p:cNvPr>
@@ -5745,7 +5859,7 @@
         </p:nvSpPr>
         <p:spPr>
           <a:xfrm>
-            <a:off x="1294648" y="1201988"/>
+            <a:off x="7185381" y="1170341"/>
             <a:ext cx="970137" cy="369332"/>
           </a:xfrm>
           <a:prstGeom prst="rect">
@@ -5768,10 +5882,10 @@
       </p:sp>
       <p:sp>
         <p:nvSpPr>
-          <p:cNvPr id="8" name="Rectangle 7">
-            <a:extLst>
-              <a:ext uri="{FF2B5EF4-FFF2-40B4-BE49-F238E27FC236}">
-                <a16:creationId xmlns:a16="http://schemas.microsoft.com/office/drawing/2014/main" id="{A5B482B9-3CC8-D647-9AFB-6941BA304B20}"/>
+          <p:cNvPr id="18" name="Rectangle 17">
+            <a:extLst>
+              <a:ext uri="{FF2B5EF4-FFF2-40B4-BE49-F238E27FC236}">
+                <a16:creationId xmlns:a16="http://schemas.microsoft.com/office/drawing/2014/main" id="{DC0EA990-6F5B-FC48-806B-2D67A2E203A2}"/>
               </a:ext>
             </a:extLst>
           </p:cNvPr>
@@ -5780,8 +5894,8 @@
         </p:nvSpPr>
         <p:spPr>
           <a:xfrm>
-            <a:off x="6091084" y="619432"/>
-            <a:ext cx="3008671" cy="2566219"/>
+            <a:off x="7236614" y="2296573"/>
+            <a:ext cx="3008671" cy="1468448"/>
           </a:xfrm>
           <a:prstGeom prst="rect">
             <a:avLst/>
@@ -5815,10 +5929,10 @@
       </p:sp>
       <p:sp>
         <p:nvSpPr>
-          <p:cNvPr id="9" name="TextBox 8">
-            <a:extLst>
-              <a:ext uri="{FF2B5EF4-FFF2-40B4-BE49-F238E27FC236}">
-                <a16:creationId xmlns:a16="http://schemas.microsoft.com/office/drawing/2014/main" id="{B8AE9FCE-2524-0E4D-BBE6-253514E3576F}"/>
+          <p:cNvPr id="19" name="TextBox 18">
+            <a:extLst>
+              <a:ext uri="{FF2B5EF4-FFF2-40B4-BE49-F238E27FC236}">
+                <a16:creationId xmlns:a16="http://schemas.microsoft.com/office/drawing/2014/main" id="{FBFA9517-77BB-CA4F-90E6-EB4C6A4846E9}"/>
               </a:ext>
             </a:extLst>
           </p:cNvPr>
@@ -5827,8 +5941,8 @@
         </p:nvSpPr>
         <p:spPr>
           <a:xfrm>
-            <a:off x="7049729" y="693175"/>
-            <a:ext cx="848053" cy="369332"/>
+            <a:off x="8195259" y="2370315"/>
+            <a:ext cx="843629" cy="369332"/>
           </a:xfrm>
           <a:prstGeom prst="rect">
             <a:avLst/>
@@ -5842,19 +5956,18 @@
           <a:lstStyle/>
           <a:p>
             <a:r>
-              <a:rPr lang="en-US" dirty="0" err="1"/>
-              <a:t>Vemno</a:t>
-            </a:r>
-            <a:endParaRPr lang="en-US" dirty="0"/>
-          </a:p>
-        </p:txBody>
-      </p:sp>
-      <p:sp>
-        <p:nvSpPr>
-          <p:cNvPr id="10" name="Rounded Rectangle 9">
-            <a:extLst>
-              <a:ext uri="{FF2B5EF4-FFF2-40B4-BE49-F238E27FC236}">
-                <a16:creationId xmlns:a16="http://schemas.microsoft.com/office/drawing/2014/main" id="{17B3A6F5-BC1C-8044-AE02-8D582B7C152F}"/>
+              <a:rPr lang="en-US" dirty="0"/>
+              <a:t>Money</a:t>
+            </a:r>
+          </a:p>
+        </p:txBody>
+      </p:sp>
+      <p:sp>
+        <p:nvSpPr>
+          <p:cNvPr id="20" name="Rounded Rectangle 19">
+            <a:extLst>
+              <a:ext uri="{FF2B5EF4-FFF2-40B4-BE49-F238E27FC236}">
+                <a16:creationId xmlns:a16="http://schemas.microsoft.com/office/drawing/2014/main" id="{5E6055DE-4F03-D145-91D4-F2FDAB0EA07B}"/>
               </a:ext>
             </a:extLst>
           </p:cNvPr>
@@ -5863,7 +5976,7 @@
         </p:nvSpPr>
         <p:spPr>
           <a:xfrm>
-            <a:off x="6754760" y="1334887"/>
+            <a:off x="7961174" y="2706305"/>
             <a:ext cx="1415846" cy="390384"/>
           </a:xfrm>
           <a:prstGeom prst="roundRect">
@@ -5898,10 +6011,10 @@
       </p:sp>
       <p:sp>
         <p:nvSpPr>
-          <p:cNvPr id="11" name="TextBox 10">
-            <a:extLst>
-              <a:ext uri="{FF2B5EF4-FFF2-40B4-BE49-F238E27FC236}">
-                <a16:creationId xmlns:a16="http://schemas.microsoft.com/office/drawing/2014/main" id="{053A487E-3D2D-1742-9E03-31C4F1C2B8E6}"/>
+          <p:cNvPr id="21" name="TextBox 20">
+            <a:extLst>
+              <a:ext uri="{FF2B5EF4-FFF2-40B4-BE49-F238E27FC236}">
+                <a16:creationId xmlns:a16="http://schemas.microsoft.com/office/drawing/2014/main" id="{B981C66A-1772-D948-B2D8-4F4AC31AEE02}"/>
               </a:ext>
             </a:extLst>
           </p:cNvPr>
@@ -5910,7 +6023,7 @@
         </p:nvSpPr>
         <p:spPr>
           <a:xfrm>
-            <a:off x="7081007" y="1349347"/>
+            <a:off x="8287421" y="2694462"/>
             <a:ext cx="763351" cy="369332"/>
           </a:xfrm>
           <a:prstGeom prst="rect">
@@ -5933,10 +6046,10 @@
       </p:sp>
       <p:sp>
         <p:nvSpPr>
-          <p:cNvPr id="12" name="Rounded Rectangle 11">
-            <a:extLst>
-              <a:ext uri="{FF2B5EF4-FFF2-40B4-BE49-F238E27FC236}">
-                <a16:creationId xmlns:a16="http://schemas.microsoft.com/office/drawing/2014/main" id="{C00D69CD-CA84-8449-A2CC-BA74965F7857}"/>
+          <p:cNvPr id="22" name="Rounded Rectangle 21">
+            <a:extLst>
+              <a:ext uri="{FF2B5EF4-FFF2-40B4-BE49-F238E27FC236}">
+                <a16:creationId xmlns:a16="http://schemas.microsoft.com/office/drawing/2014/main" id="{C04A0DAF-8088-BF4B-BF39-B8D0B756B09D}"/>
               </a:ext>
             </a:extLst>
           </p:cNvPr>
@@ -5945,7 +6058,7 @@
         </p:nvSpPr>
         <p:spPr>
           <a:xfrm>
-            <a:off x="6754760" y="2120159"/>
+            <a:off x="7986660" y="3156179"/>
             <a:ext cx="1415846" cy="390384"/>
           </a:xfrm>
           <a:prstGeom prst="roundRect">
@@ -5980,10 +6093,10 @@
       </p:sp>
       <p:sp>
         <p:nvSpPr>
-          <p:cNvPr id="13" name="TextBox 12">
-            <a:extLst>
-              <a:ext uri="{FF2B5EF4-FFF2-40B4-BE49-F238E27FC236}">
-                <a16:creationId xmlns:a16="http://schemas.microsoft.com/office/drawing/2014/main" id="{48E66FAA-3842-4B43-8661-2C9C358AB303}"/>
+          <p:cNvPr id="23" name="TextBox 22">
+            <a:extLst>
+              <a:ext uri="{FF2B5EF4-FFF2-40B4-BE49-F238E27FC236}">
+                <a16:creationId xmlns:a16="http://schemas.microsoft.com/office/drawing/2014/main" id="{AFEFC2FA-FC16-4B4E-BA2F-00FFDF540C11}"/>
               </a:ext>
             </a:extLst>
           </p:cNvPr>
@@ -5992,7 +6105,7 @@
         </p:nvSpPr>
         <p:spPr>
           <a:xfrm>
-            <a:off x="6906026" y="2135690"/>
+            <a:off x="8141938" y="3137537"/>
             <a:ext cx="1235082" cy="369332"/>
           </a:xfrm>
           <a:prstGeom prst="rect">
@@ -6015,10 +6128,10 @@
       </p:sp>
       <p:sp>
         <p:nvSpPr>
-          <p:cNvPr id="14" name="Rectangle 13">
-            <a:extLst>
-              <a:ext uri="{FF2B5EF4-FFF2-40B4-BE49-F238E27FC236}">
-                <a16:creationId xmlns:a16="http://schemas.microsoft.com/office/drawing/2014/main" id="{79192606-12FA-D040-AD19-235952DAACB0}"/>
+          <p:cNvPr id="24" name="Rectangle 23">
+            <a:extLst>
+              <a:ext uri="{FF2B5EF4-FFF2-40B4-BE49-F238E27FC236}">
+                <a16:creationId xmlns:a16="http://schemas.microsoft.com/office/drawing/2014/main" id="{B302A918-EC04-D943-8D33-3E4F431DFA8C}"/>
               </a:ext>
             </a:extLst>
           </p:cNvPr>
@@ -6027,8 +6140,8 @@
         </p:nvSpPr>
         <p:spPr>
           <a:xfrm>
-            <a:off x="6091084" y="3554362"/>
-            <a:ext cx="3008671" cy="2566219"/>
+            <a:off x="7236614" y="3806867"/>
+            <a:ext cx="3008671" cy="2151411"/>
           </a:xfrm>
           <a:prstGeom prst="rect">
             <a:avLst/>
@@ -6062,10 +6175,10 @@
       </p:sp>
       <p:sp>
         <p:nvSpPr>
-          <p:cNvPr id="15" name="TextBox 14">
-            <a:extLst>
-              <a:ext uri="{FF2B5EF4-FFF2-40B4-BE49-F238E27FC236}">
-                <a16:creationId xmlns:a16="http://schemas.microsoft.com/office/drawing/2014/main" id="{7182F492-A4D6-8746-83C4-F1C3A241E00E}"/>
+          <p:cNvPr id="25" name="TextBox 24">
+            <a:extLst>
+              <a:ext uri="{FF2B5EF4-FFF2-40B4-BE49-F238E27FC236}">
+                <a16:creationId xmlns:a16="http://schemas.microsoft.com/office/drawing/2014/main" id="{CB3AB772-8834-7747-8FD9-83C7C40AD611}"/>
               </a:ext>
             </a:extLst>
           </p:cNvPr>
@@ -6074,7 +6187,7 @@
         </p:nvSpPr>
         <p:spPr>
           <a:xfrm>
-            <a:off x="7049729" y="3628105"/>
+            <a:off x="8261782" y="3806867"/>
             <a:ext cx="1106072" cy="646331"/>
           </a:xfrm>
           <a:prstGeom prst="rect">
@@ -6103,10 +6216,10 @@
       </p:sp>
       <p:sp>
         <p:nvSpPr>
-          <p:cNvPr id="16" name="Rounded Rectangle 15">
-            <a:extLst>
-              <a:ext uri="{FF2B5EF4-FFF2-40B4-BE49-F238E27FC236}">
-                <a16:creationId xmlns:a16="http://schemas.microsoft.com/office/drawing/2014/main" id="{F212743F-CDCB-604B-A675-D299CD2CBE21}"/>
+          <p:cNvPr id="26" name="Rounded Rectangle 25">
+            <a:extLst>
+              <a:ext uri="{FF2B5EF4-FFF2-40B4-BE49-F238E27FC236}">
+                <a16:creationId xmlns:a16="http://schemas.microsoft.com/office/drawing/2014/main" id="{33A84634-F98C-4C43-B96E-CB43611483AB}"/>
               </a:ext>
             </a:extLst>
           </p:cNvPr>
@@ -6115,7 +6228,7 @@
         </p:nvSpPr>
         <p:spPr>
           <a:xfrm>
-            <a:off x="6609166" y="4274436"/>
+            <a:off x="7821219" y="4453198"/>
             <a:ext cx="1828801" cy="1305073"/>
           </a:xfrm>
           <a:prstGeom prst="roundRect">
@@ -6150,10 +6263,10 @@
       </p:sp>
       <p:sp>
         <p:nvSpPr>
-          <p:cNvPr id="20" name="TextBox 19">
-            <a:extLst>
-              <a:ext uri="{FF2B5EF4-FFF2-40B4-BE49-F238E27FC236}">
-                <a16:creationId xmlns:a16="http://schemas.microsoft.com/office/drawing/2014/main" id="{5C708D78-6676-AB46-9516-A299AEE4CEC3}"/>
+          <p:cNvPr id="27" name="TextBox 26">
+            <a:extLst>
+              <a:ext uri="{FF2B5EF4-FFF2-40B4-BE49-F238E27FC236}">
+                <a16:creationId xmlns:a16="http://schemas.microsoft.com/office/drawing/2014/main" id="{9BF95625-E20C-C143-8898-0DC4663BFDBB}"/>
               </a:ext>
             </a:extLst>
           </p:cNvPr>
@@ -6162,7 +6275,7 @@
         </p:nvSpPr>
         <p:spPr>
           <a:xfrm>
-            <a:off x="6620290" y="4379180"/>
+            <a:off x="7832343" y="4557942"/>
             <a:ext cx="1817677" cy="1200329"/>
           </a:xfrm>
           <a:prstGeom prst="rect">
@@ -6198,10 +6311,45 @@
           </a:p>
         </p:txBody>
       </p:sp>
+      <p:sp>
+        <p:nvSpPr>
+          <p:cNvPr id="28" name="TextBox 27">
+            <a:extLst>
+              <a:ext uri="{FF2B5EF4-FFF2-40B4-BE49-F238E27FC236}">
+                <a16:creationId xmlns:a16="http://schemas.microsoft.com/office/drawing/2014/main" id="{41E2EDB3-B0F4-F445-AA9D-9BD66A9680B0}"/>
+              </a:ext>
+            </a:extLst>
+          </p:cNvPr>
+          <p:cNvSpPr txBox="1"/>
+          <p:nvPr/>
+        </p:nvSpPr>
+        <p:spPr>
+          <a:xfrm>
+            <a:off x="7521413" y="212193"/>
+            <a:ext cx="858953" cy="369332"/>
+          </a:xfrm>
+          <a:prstGeom prst="rect">
+            <a:avLst/>
+          </a:prstGeom>
+          <a:noFill/>
+        </p:spPr>
+        <p:txBody>
+          <a:bodyPr wrap="none" rtlCol="0">
+            <a:spAutoFit/>
+          </a:bodyPr>
+          <a:lstStyle/>
+          <a:p>
+            <a:r>
+              <a:rPr lang="en-US" dirty="0"/>
+              <a:t>/create</a:t>
+            </a:r>
+          </a:p>
+        </p:txBody>
+      </p:sp>
     </p:spTree>
     <p:extLst>
       <p:ext uri="{BB962C8B-B14F-4D97-AF65-F5344CB8AC3E}">
-        <p14:creationId xmlns:p14="http://schemas.microsoft.com/office/powerpoint/2010/main" val="1741629701"/>
+        <p14:creationId xmlns:p14="http://schemas.microsoft.com/office/powerpoint/2010/main" val="3348089988"/>
       </p:ext>
     </p:extLst>
   </p:cSld>

</xml_diff>